<commit_message>
Update assets after review
entspricht Lieferung an BLW vom 29.04.2025
</commit_message>
<xml_diff>
--- a/MGDM153.4.pptx
+++ b/MGDM153.4.pptx
@@ -8402,7 +8402,7 @@
                   <a:schemeClr val="bg1"/>
                 </a:solidFill>
               </a:rPr>
-              <a:t>Massnahmen-Liste (22) ausgelagert in externer Katalog</a:t>
+              <a:t>Massnahmen-Liste (22) ausgelagert in externer XML-Katalog</a:t>
             </a:r>
           </a:p>
           <a:p>
@@ -8438,7 +8438,7 @@
                 <a:ea typeface="+mn-ea"/>
                 <a:cs typeface="Arial" pitchFamily="34" charset="0"/>
               </a:rPr>
-              <a:t>2D-Geometrien</a:t>
+              <a:t>Geometrien: 2D / LV95</a:t>
             </a:r>
           </a:p>
           <a:p>
@@ -8498,7 +8498,7 @@
                 <a:ea typeface="+mn-ea"/>
                 <a:cs typeface="Arial" pitchFamily="34" charset="0"/>
               </a:rPr>
-              <a:t>Erfassungsfreundlich modelliert: </a:t>
+              <a:t>Erfassungsfreundlich offen modelliert: </a:t>
             </a:r>
           </a:p>
           <a:p>
@@ -8989,8 +8989,8 @@
         </p:blipFill>
         <p:spPr>
           <a:xfrm>
-            <a:off x="464761" y="1628774"/>
-            <a:ext cx="8020333" cy="5121241"/>
+            <a:off x="464761" y="1262455"/>
+            <a:ext cx="8462671" cy="5403688"/>
           </a:xfrm>
           <a:prstGeom prst="rect">
             <a:avLst/>

</xml_diff>